<commit_message>
some small updates on documentation and presentation
</commit_message>
<xml_diff>
--- a/documentation/AIDA Project - Customer Churn.pptx
+++ b/documentation/AIDA Project - Customer Churn.pptx
@@ -8198,7 +8198,15 @@
             </a:pPr>
             <a:r>
               <a:rPr lang="de" sz="1100"/>
-              <a:t>Feature Importance Comparision </a:t>
+              <a:t>Feature Importance </a:t>
+            </a:r>
+            <a:r>
+              <a:rPr lang="de" sz="1100"/>
+              <a:t>Comparison</a:t>
+            </a:r>
+            <a:r>
+              <a:rPr lang="de" sz="1100"/>
+              <a:t> </a:t>
             </a:r>
             <a:endParaRPr sz="1100"/>
           </a:p>
@@ -8263,7 +8271,7 @@
             <a:tbl>
               <a:tblPr>
                 <a:noFill/>
-                <a:tableStyleId>{3A0D29A6-FE3E-4B7C-A5E4-36875FBD63F5}</a:tableStyleId>
+                <a:tableStyleId>{71A19095-2C22-4B84-8F3B-16EF24F9383B}</a:tableStyleId>
               </a:tblPr>
               <a:tblGrid>
                 <a:gridCol w="2154875"/>
@@ -8293,7 +8301,7 @@
                             <a:srgbClr val="FFFFFF"/>
                           </a:highlight>
                         </a:rPr>
-                        <a:t>Descission Tree Classifier (DTC)</a:t>
+                        <a:t>Decision Tree Classifier (DTC)</a:t>
                       </a:r>
                       <a:endParaRPr sz="1200"/>
                     </a:p>
@@ -9635,7 +9643,7 @@
             </a:pPr>
             <a:r>
               <a:rPr lang="de"/>
-              <a:t>Simple Neuronal Network</a:t>
+              <a:t>Simple Neural Network</a:t>
             </a:r>
             <a:endParaRPr/>
           </a:p>
@@ -9953,7 +9961,7 @@
             </a:r>
             <a:r>
               <a:rPr lang="de"/>
-              <a:t>Neuronal Network</a:t>
+              <a:t>Neural Network</a:t>
             </a:r>
             <a:endParaRPr/>
           </a:p>
@@ -10464,7 +10472,7 @@
             <a:tbl>
               <a:tblPr>
                 <a:noFill/>
-                <a:tableStyleId>{28D582A9-255A-41A2-9E22-17A1CEF368CA}</a:tableStyleId>
+                <a:tableStyleId>{738DBC94-3A76-405C-A24A-ABCE1438C958}</a:tableStyleId>
               </a:tblPr>
               <a:tblGrid>
                 <a:gridCol w="942975"/>
@@ -14548,7 +14556,7 @@
             </a:pPr>
             <a:r>
               <a:rPr lang="de" sz="1400"/>
-              <a:t>Neuronal Networks with low complexity outperform classical classifiers.</a:t>
+              <a:t>Neural Networks with low complexity outperform classical classifiers.</a:t>
             </a:r>
             <a:endParaRPr sz="1400"/>
           </a:p>
@@ -14595,7 +14603,7 @@
                   <a:srgbClr val="000000"/>
                 </a:solidFill>
               </a:rPr>
-              <a:t>Thus a neural network is recommended for predictions</a:t>
+              <a:t>Thus a neural network is recommended for predictions!</a:t>
             </a:r>
             <a:endParaRPr b="1" sz="1300">
               <a:solidFill>
@@ -14644,7 +14652,7 @@
                   <a:srgbClr val="000000"/>
                 </a:solidFill>
               </a:rPr>
-              <a:t>In general it is possible to to reduce the false positives and reach a better precision for churn predictions but this reduces the recall rate. </a:t>
+              <a:t>In general it is possible to further reduce the false positives and reach a better precision for churn predictions but this also reduces the recall rate. </a:t>
             </a:r>
             <a:endParaRPr sz="1300">
               <a:solidFill>
@@ -15512,7 +15520,7 @@
             <a:tbl>
               <a:tblPr>
                 <a:noFill/>
-                <a:tableStyleId>{3A0D29A6-FE3E-4B7C-A5E4-36875FBD63F5}</a:tableStyleId>
+                <a:tableStyleId>{71A19095-2C22-4B84-8F3B-16EF24F9383B}</a:tableStyleId>
               </a:tblPr>
               <a:tblGrid>
                 <a:gridCol w="1217225"/>
@@ -17203,8 +17211,8 @@
         </p:nvSpPr>
         <p:spPr>
           <a:xfrm>
-            <a:off x="5731700" y="4193625"/>
-            <a:ext cx="2706900" cy="947100"/>
+            <a:off x="5257125" y="4193625"/>
+            <a:ext cx="3529200" cy="947100"/>
           </a:xfrm>
           <a:prstGeom prst="rect">
             <a:avLst/>

</xml_diff>